<commit_message>
creando dashboard navigation y demas
</commit_message>
<xml_diff>
--- a/documentacion/clase 1.pptx
+++ b/documentacion/clase 1.pptx
@@ -17,8 +17,9 @@
     <p:sldId id="265" r:id="rId11"/>
     <p:sldId id="266" r:id="rId12"/>
     <p:sldId id="267" r:id="rId13"/>
-    <p:sldId id="268" r:id="rId14"/>
-    <p:sldId id="269" r:id="rId15"/>
+    <p:sldId id="270" r:id="rId14"/>
+    <p:sldId id="268" r:id="rId15"/>
+    <p:sldId id="269" r:id="rId16"/>
   </p:sldIdLst>
   <p:sldSz cx="12192000" cy="6858000"/>
   <p:notesSz cx="6858000" cy="9144000"/>
@@ -847,7 +848,7 @@
           <a:p>
             <a:fld id="{06206417-23C8-4387-9E06-10B9E10D2224}" type="datetimeFigureOut">
               <a:rPr lang="es-PE" smtClean="0"/>
-              <a:t>22/04/2022</a:t>
+              <a:t>28/04/2022</a:t>
             </a:fld>
             <a:endParaRPr lang="es-PE"/>
           </a:p>
@@ -1098,7 +1099,7 @@
           <a:p>
             <a:fld id="{06206417-23C8-4387-9E06-10B9E10D2224}" type="datetimeFigureOut">
               <a:rPr lang="es-PE" smtClean="0"/>
-              <a:t>22/04/2022</a:t>
+              <a:t>28/04/2022</a:t>
             </a:fld>
             <a:endParaRPr lang="es-PE"/>
           </a:p>
@@ -1412,7 +1413,7 @@
           <a:p>
             <a:fld id="{06206417-23C8-4387-9E06-10B9E10D2224}" type="datetimeFigureOut">
               <a:rPr lang="es-PE" smtClean="0"/>
-              <a:t>22/04/2022</a:t>
+              <a:t>28/04/2022</a:t>
             </a:fld>
             <a:endParaRPr lang="es-PE"/>
           </a:p>
@@ -1753,7 +1754,7 @@
           <a:p>
             <a:fld id="{06206417-23C8-4387-9E06-10B9E10D2224}" type="datetimeFigureOut">
               <a:rPr lang="es-PE" smtClean="0"/>
-              <a:t>22/04/2022</a:t>
+              <a:t>28/04/2022</a:t>
             </a:fld>
             <a:endParaRPr lang="es-PE"/>
           </a:p>
@@ -2067,7 +2068,7 @@
           <a:p>
             <a:fld id="{06206417-23C8-4387-9E06-10B9E10D2224}" type="datetimeFigureOut">
               <a:rPr lang="es-PE" smtClean="0"/>
-              <a:t>22/04/2022</a:t>
+              <a:t>28/04/2022</a:t>
             </a:fld>
             <a:endParaRPr lang="es-PE"/>
           </a:p>
@@ -2460,7 +2461,7 @@
           <a:p>
             <a:fld id="{06206417-23C8-4387-9E06-10B9E10D2224}" type="datetimeFigureOut">
               <a:rPr lang="es-PE" smtClean="0"/>
-              <a:t>22/04/2022</a:t>
+              <a:t>28/04/2022</a:t>
             </a:fld>
             <a:endParaRPr lang="es-PE"/>
           </a:p>
@@ -2630,7 +2631,7 @@
           <a:p>
             <a:fld id="{06206417-23C8-4387-9E06-10B9E10D2224}" type="datetimeFigureOut">
               <a:rPr lang="es-PE" smtClean="0"/>
-              <a:t>22/04/2022</a:t>
+              <a:t>28/04/2022</a:t>
             </a:fld>
             <a:endParaRPr lang="es-PE"/>
           </a:p>
@@ -2810,7 +2811,7 @@
           <a:p>
             <a:fld id="{06206417-23C8-4387-9E06-10B9E10D2224}" type="datetimeFigureOut">
               <a:rPr lang="es-PE" smtClean="0"/>
-              <a:t>22/04/2022</a:t>
+              <a:t>28/04/2022</a:t>
             </a:fld>
             <a:endParaRPr lang="es-PE"/>
           </a:p>
@@ -2986,7 +2987,7 @@
           <a:p>
             <a:fld id="{06206417-23C8-4387-9E06-10B9E10D2224}" type="datetimeFigureOut">
               <a:rPr lang="es-PE" smtClean="0"/>
-              <a:t>22/04/2022</a:t>
+              <a:t>28/04/2022</a:t>
             </a:fld>
             <a:endParaRPr lang="es-PE"/>
           </a:p>
@@ -3233,7 +3234,7 @@
           <a:p>
             <a:fld id="{06206417-23C8-4387-9E06-10B9E10D2224}" type="datetimeFigureOut">
               <a:rPr lang="es-PE" smtClean="0"/>
-              <a:t>22/04/2022</a:t>
+              <a:t>28/04/2022</a:t>
             </a:fld>
             <a:endParaRPr lang="es-PE"/>
           </a:p>
@@ -3465,7 +3466,7 @@
           <a:p>
             <a:fld id="{06206417-23C8-4387-9E06-10B9E10D2224}" type="datetimeFigureOut">
               <a:rPr lang="es-PE" smtClean="0"/>
-              <a:t>22/04/2022</a:t>
+              <a:t>28/04/2022</a:t>
             </a:fld>
             <a:endParaRPr lang="es-PE"/>
           </a:p>
@@ -3839,7 +3840,7 @@
           <a:p>
             <a:fld id="{06206417-23C8-4387-9E06-10B9E10D2224}" type="datetimeFigureOut">
               <a:rPr lang="es-PE" smtClean="0"/>
-              <a:t>22/04/2022</a:t>
+              <a:t>28/04/2022</a:t>
             </a:fld>
             <a:endParaRPr lang="es-PE"/>
           </a:p>
@@ -3962,7 +3963,7 @@
           <a:p>
             <a:fld id="{06206417-23C8-4387-9E06-10B9E10D2224}" type="datetimeFigureOut">
               <a:rPr lang="es-PE" smtClean="0"/>
-              <a:t>22/04/2022</a:t>
+              <a:t>28/04/2022</a:t>
             </a:fld>
             <a:endParaRPr lang="es-PE"/>
           </a:p>
@@ -4057,7 +4058,7 @@
           <a:p>
             <a:fld id="{06206417-23C8-4387-9E06-10B9E10D2224}" type="datetimeFigureOut">
               <a:rPr lang="es-PE" smtClean="0"/>
-              <a:t>22/04/2022</a:t>
+              <a:t>28/04/2022</a:t>
             </a:fld>
             <a:endParaRPr lang="es-PE"/>
           </a:p>
@@ -4312,7 +4313,7 @@
           <a:p>
             <a:fld id="{06206417-23C8-4387-9E06-10B9E10D2224}" type="datetimeFigureOut">
               <a:rPr lang="es-PE" smtClean="0"/>
-              <a:t>22/04/2022</a:t>
+              <a:t>28/04/2022</a:t>
             </a:fld>
             <a:endParaRPr lang="es-PE"/>
           </a:p>
@@ -4575,7 +4576,7 @@
           <a:p>
             <a:fld id="{06206417-23C8-4387-9E06-10B9E10D2224}" type="datetimeFigureOut">
               <a:rPr lang="es-PE" smtClean="0"/>
-              <a:t>22/04/2022</a:t>
+              <a:t>28/04/2022</a:t>
             </a:fld>
             <a:endParaRPr lang="es-PE"/>
           </a:p>
@@ -5318,7 +5319,7 @@
           <a:p>
             <a:fld id="{06206417-23C8-4387-9E06-10B9E10D2224}" type="datetimeFigureOut">
               <a:rPr lang="es-PE" smtClean="0"/>
-              <a:t>22/04/2022</a:t>
+              <a:t>28/04/2022</a:t>
             </a:fld>
             <a:endParaRPr lang="es-PE"/>
           </a:p>
@@ -5896,10 +5897,54 @@
           <a:bodyPr/>
           <a:lstStyle/>
           <a:p>
+            <a:r>
+              <a:rPr lang="en-US" dirty="0" err="1"/>
+              <a:t>Qusoft</a:t>
+            </a:r>
+            <a:r>
+              <a:rPr lang="en-US" dirty="0"/>
+              <a:t> Community</a:t>
+            </a:r>
             <a:endParaRPr lang="es-PE" dirty="0"/>
           </a:p>
         </p:txBody>
       </p:sp>
+      <p:pic>
+        <p:nvPicPr>
+          <p:cNvPr id="5" name="Imagen 4">
+            <a:extLst>
+              <a:ext uri="{FF2B5EF4-FFF2-40B4-BE49-F238E27FC236}">
+                <a16:creationId xmlns:a16="http://schemas.microsoft.com/office/drawing/2014/main" id="{14AFF4B6-5925-4753-B31F-AC9CABC53643}"/>
+              </a:ext>
+            </a:extLst>
+          </p:cNvPr>
+          <p:cNvPicPr>
+            <a:picLocks noChangeAspect="1"/>
+          </p:cNvPicPr>
+          <p:nvPr/>
+        </p:nvPicPr>
+        <p:blipFill>
+          <a:blip r:embed="rId2">
+            <a:extLst>
+              <a:ext uri="{28A0092B-C50C-407E-A947-70E740481C1C}">
+                <a14:useLocalDpi xmlns:a14="http://schemas.microsoft.com/office/drawing/2010/main" val="0"/>
+              </a:ext>
+            </a:extLst>
+          </a:blip>
+          <a:stretch>
+            <a:fillRect/>
+          </a:stretch>
+        </p:blipFill>
+        <p:spPr>
+          <a:xfrm>
+            <a:off x="1507067" y="309406"/>
+            <a:ext cx="2000714" cy="1646302"/>
+          </a:xfrm>
+          <a:prstGeom prst="rect">
+            <a:avLst/>
+          </a:prstGeom>
+        </p:spPr>
+      </p:pic>
     </p:spTree>
     <p:extLst>
       <p:ext uri="{BB962C8B-B14F-4D97-AF65-F5344CB8AC3E}">
@@ -6253,6 +6298,147 @@
           <p:cNvPr id="2" name="Título 1">
             <a:extLst>
               <a:ext uri="{FF2B5EF4-FFF2-40B4-BE49-F238E27FC236}">
+                <a16:creationId xmlns:a16="http://schemas.microsoft.com/office/drawing/2014/main" id="{3881C6D9-3E7F-4EA9-8BC6-A089D5D2E42C}"/>
+              </a:ext>
+            </a:extLst>
+          </p:cNvPr>
+          <p:cNvSpPr>
+            <a:spLocks noGrp="1"/>
+          </p:cNvSpPr>
+          <p:nvPr>
+            <p:ph type="title"/>
+          </p:nvPr>
+        </p:nvSpPr>
+        <p:spPr/>
+        <p:txBody>
+          <a:bodyPr/>
+          <a:lstStyle/>
+          <a:p>
+            <a:r>
+              <a:rPr lang="en-US" dirty="0"/>
+              <a:t>Link de </a:t>
+            </a:r>
+            <a:r>
+              <a:rPr lang="en-US" dirty="0" err="1"/>
+              <a:t>Github</a:t>
+            </a:r>
+            <a:endParaRPr lang="es-PE" dirty="0"/>
+          </a:p>
+        </p:txBody>
+      </p:sp>
+      <p:sp>
+        <p:nvSpPr>
+          <p:cNvPr id="3" name="Marcador de contenido 2">
+            <a:extLst>
+              <a:ext uri="{FF2B5EF4-FFF2-40B4-BE49-F238E27FC236}">
+                <a16:creationId xmlns:a16="http://schemas.microsoft.com/office/drawing/2014/main" id="{EFA6E735-8BF2-4E75-911F-47575655BD46}"/>
+              </a:ext>
+            </a:extLst>
+          </p:cNvPr>
+          <p:cNvSpPr>
+            <a:spLocks noGrp="1"/>
+          </p:cNvSpPr>
+          <p:nvPr>
+            <p:ph idx="1"/>
+          </p:nvPr>
+        </p:nvSpPr>
+        <p:spPr/>
+        <p:txBody>
+          <a:bodyPr/>
+          <a:lstStyle/>
+          <a:p>
+            <a:r>
+              <a:rPr lang="en-US" dirty="0"/>
+              <a:t>terminal/websites&gt; </a:t>
+            </a:r>
+            <a:r>
+              <a:rPr lang="es-PE" dirty="0" err="1"/>
+              <a:t>git</a:t>
+            </a:r>
+            <a:r>
+              <a:rPr lang="es-PE" dirty="0"/>
+              <a:t> clone  </a:t>
+            </a:r>
+            <a:r>
+              <a:rPr lang="es-PE" dirty="0">
+                <a:hlinkClick r:id="rId2"/>
+              </a:rPr>
+              <a:t>https://github.com/rabp99/app-heroes-frontend.git --</a:t>
+            </a:r>
+            <a:r>
+              <a:rPr lang="es-PE" dirty="0" err="1">
+                <a:hlinkClick r:id="rId2"/>
+              </a:rPr>
+              <a:t>branch</a:t>
+            </a:r>
+            <a:r>
+              <a:rPr lang="es-PE" dirty="0">
+                <a:hlinkClick r:id="rId2"/>
+              </a:rPr>
+              <a:t> v1.0.0</a:t>
+            </a:r>
+            <a:endParaRPr lang="es-PE" dirty="0"/>
+          </a:p>
+          <a:p>
+            <a:r>
+              <a:rPr lang="en-US" dirty="0"/>
+              <a:t>terminal/websites&gt;</a:t>
+            </a:r>
+            <a:r>
+              <a:rPr lang="es-PE" dirty="0"/>
+              <a:t> </a:t>
+            </a:r>
+            <a:r>
+              <a:rPr lang="es-PE" dirty="0" err="1"/>
+              <a:t>npm</a:t>
+            </a:r>
+            <a:r>
+              <a:rPr lang="es-PE" dirty="0"/>
+              <a:t> </a:t>
+            </a:r>
+            <a:r>
+              <a:rPr lang="es-PE" dirty="0" err="1"/>
+              <a:t>install</a:t>
+            </a:r>
+            <a:endParaRPr lang="es-PE" dirty="0"/>
+          </a:p>
+        </p:txBody>
+      </p:sp>
+    </p:spTree>
+    <p:extLst>
+      <p:ext uri="{BB962C8B-B14F-4D97-AF65-F5344CB8AC3E}">
+        <p14:creationId xmlns:p14="http://schemas.microsoft.com/office/powerpoint/2010/main" val="3334021577"/>
+      </p:ext>
+    </p:extLst>
+  </p:cSld>
+  <p:clrMapOvr>
+    <a:masterClrMapping/>
+  </p:clrMapOvr>
+</p:sld>
+</file>
+
+<file path=ppt/slides/slide14.xml><?xml version="1.0" encoding="utf-8"?>
+<p:sld xmlns:a="http://schemas.openxmlformats.org/drawingml/2006/main" xmlns:r="http://schemas.openxmlformats.org/officeDocument/2006/relationships" xmlns:p="http://schemas.openxmlformats.org/presentationml/2006/main">
+  <p:cSld>
+    <p:spTree>
+      <p:nvGrpSpPr>
+        <p:cNvPr id="1" name=""/>
+        <p:cNvGrpSpPr/>
+        <p:nvPr/>
+      </p:nvGrpSpPr>
+      <p:grpSpPr>
+        <a:xfrm>
+          <a:off x="0" y="0"/>
+          <a:ext cx="0" cy="0"/>
+          <a:chOff x="0" y="0"/>
+          <a:chExt cx="0" cy="0"/>
+        </a:xfrm>
+      </p:grpSpPr>
+      <p:sp>
+        <p:nvSpPr>
+          <p:cNvPr id="2" name="Título 1">
+            <a:extLst>
+              <a:ext uri="{FF2B5EF4-FFF2-40B4-BE49-F238E27FC236}">
                 <a16:creationId xmlns:a16="http://schemas.microsoft.com/office/drawing/2014/main" id="{B1969F93-05F5-401F-A378-D4EC005447D7}"/>
               </a:ext>
             </a:extLst>
@@ -6319,7 +6505,7 @@
 </p:sld>
 </file>
 
-<file path=ppt/slides/slide14.xml><?xml version="1.0" encoding="utf-8"?>
+<file path=ppt/slides/slide15.xml><?xml version="1.0" encoding="utf-8"?>
 <p:sld xmlns:a="http://schemas.openxmlformats.org/drawingml/2006/main" xmlns:r="http://schemas.openxmlformats.org/officeDocument/2006/relationships" xmlns:p="http://schemas.openxmlformats.org/presentationml/2006/main">
   <p:cSld>
     <p:spTree>
@@ -6472,7 +6658,7 @@
         <p:spPr/>
         <p:txBody>
           <a:bodyPr>
-            <a:normAutofit lnSpcReduction="10000"/>
+            <a:normAutofit fontScale="92500" lnSpcReduction="20000"/>
           </a:bodyPr>
           <a:lstStyle/>
           <a:p>
@@ -6653,6 +6839,17 @@
             <a:r>
               <a:rPr lang="en-US" dirty="0" err="1"/>
               <a:t>edit.component</a:t>
+            </a:r>
+            <a:endParaRPr lang="en-US" dirty="0"/>
+          </a:p>
+          <a:p>
+            <a:r>
+              <a:rPr lang="en-US" dirty="0"/>
+              <a:t>Link de </a:t>
+            </a:r>
+            <a:r>
+              <a:rPr lang="en-US" dirty="0" err="1"/>
+              <a:t>Github</a:t>
             </a:r>
             <a:endParaRPr lang="en-US" dirty="0"/>
           </a:p>
@@ -7461,7 +7658,7 @@
 <file path=ppt/theme/theme1.xml><?xml version="1.0" encoding="utf-8"?>
 <a:theme xmlns:a="http://schemas.openxmlformats.org/drawingml/2006/main" name="Faceta">
   <a:themeElements>
-    <a:clrScheme name="Personalizado 3">
+    <a:clrScheme name="Personalizado 5">
       <a:dk1>
         <a:sysClr val="windowText" lastClr="000000"/>
       </a:dk1>
@@ -7475,10 +7672,10 @@
         <a:srgbClr val="EBEBEB"/>
       </a:lt2>
       <a:accent1>
-        <a:srgbClr val="EA7163"/>
+        <a:srgbClr val="FFA000"/>
       </a:accent1>
       <a:accent2>
-        <a:srgbClr val="E34837"/>
+        <a:srgbClr val="FFCF81"/>
       </a:accent2>
       <a:accent3>
         <a:srgbClr val="E6B91E"/>

</xml_diff>